<commit_message>
Finished adding the outline from the website for the JHU EP program powerpoint. Use this powerpoint to inform layout decisions for our powerpoint.
</commit_message>
<xml_diff>
--- a/Presentation_Outline.pptx
+++ b/Presentation_Outline.pptx
@@ -5,15 +5,20 @@
     <p:sldMasterId id="2147483668" r:id="rId1"/>
   </p:sldMasterIdLst>
   <p:notesMasterIdLst>
-    <p:notesMasterId r:id="rId5"/>
+    <p:notesMasterId r:id="rId10"/>
   </p:notesMasterIdLst>
   <p:handoutMasterIdLst>
-    <p:handoutMasterId r:id="rId6"/>
+    <p:handoutMasterId r:id="rId11"/>
   </p:handoutMasterIdLst>
   <p:sldIdLst>
     <p:sldId id="256" r:id="rId2"/>
     <p:sldId id="257" r:id="rId3"/>
-    <p:sldId id="258" r:id="rId4"/>
+    <p:sldId id="259" r:id="rId4"/>
+    <p:sldId id="260" r:id="rId5"/>
+    <p:sldId id="261" r:id="rId6"/>
+    <p:sldId id="262" r:id="rId7"/>
+    <p:sldId id="263" r:id="rId8"/>
+    <p:sldId id="264" r:id="rId9"/>
   </p:sldIdLst>
   <p:sldSz cx="9144000" cy="6858000" type="screen4x3"/>
   <p:notesSz cx="6858000" cy="9144000"/>
@@ -119,7 +124,12 @@
           <p14:sldIdLst>
             <p14:sldId id="256"/>
             <p14:sldId id="257"/>
-            <p14:sldId id="258"/>
+            <p14:sldId id="259"/>
+            <p14:sldId id="260"/>
+            <p14:sldId id="261"/>
+            <p14:sldId id="262"/>
+            <p14:sldId id="263"/>
+            <p14:sldId id="264"/>
           </p14:sldIdLst>
         </p14:section>
       </p14:sectionLst>
@@ -222,7 +232,7 @@
                 <a:latin typeface="Arial"/>
                 <a:cs typeface="Arial"/>
               </a:rPr>
-              <a:t>11/5/2017</a:t>
+              <a:t>11/5/17</a:t>
             </a:fld>
             <a:endParaRPr lang="en-US" sz="900" dirty="0">
               <a:solidFill>
@@ -527,7 +537,7 @@
                 <a:latin typeface="Arial"/>
                 <a:cs typeface="Arial"/>
               </a:rPr>
-              <a:t>11/5/2017</a:t>
+              <a:t>11/5/17</a:t>
             </a:fld>
             <a:endParaRPr lang="en-US" sz="900" dirty="0">
               <a:solidFill>
@@ -945,7 +955,7 @@
   <p:timing>
     <p:tnLst>
       <p:par>
-        <p:cTn id="1" dur="indefinite" restart="never" nodeType="tmRoot"/>
+        <p:cTn xmlns:p14="http://schemas.microsoft.com/office/powerpoint/2010/main" id="1" dur="indefinite" restart="never" nodeType="tmRoot"/>
       </p:par>
     </p:tnLst>
   </p:timing>
@@ -1412,7 +1422,7 @@
   <p:timing>
     <p:tnLst>
       <p:par>
-        <p:cTn id="1" dur="indefinite" restart="never" nodeType="tmRoot"/>
+        <p:cTn xmlns:p14="http://schemas.microsoft.com/office/powerpoint/2010/main" id="1" dur="indefinite" restart="never" nodeType="tmRoot"/>
       </p:par>
     </p:tnLst>
   </p:timing>
@@ -2508,7 +2518,7 @@
   <p:timing>
     <p:tnLst>
       <p:par>
-        <p:cTn id="1" dur="indefinite" restart="never" nodeType="tmRoot"/>
+        <p:cTn xmlns:p14="http://schemas.microsoft.com/office/powerpoint/2010/main" id="1" dur="indefinite" restart="never" nodeType="tmRoot"/>
       </p:par>
     </p:tnLst>
   </p:timing>
@@ -3013,7 +3023,7 @@
   <p:timing>
     <p:tnLst>
       <p:par>
-        <p:cTn id="1" dur="indefinite" restart="never" nodeType="tmRoot"/>
+        <p:cTn xmlns:p14="http://schemas.microsoft.com/office/powerpoint/2010/main" id="1" dur="indefinite" restart="never" nodeType="tmRoot"/>
       </p:par>
     </p:tnLst>
   </p:timing>
@@ -3531,7 +3541,7 @@
   <p:timing>
     <p:tnLst>
       <p:par>
-        <p:cTn id="1" dur="indefinite" restart="never" nodeType="tmRoot"/>
+        <p:cTn xmlns:p14="http://schemas.microsoft.com/office/powerpoint/2010/main" id="1" dur="indefinite" restart="never" nodeType="tmRoot"/>
       </p:par>
     </p:tnLst>
   </p:timing>
@@ -3870,6 +3880,16 @@
           <a:bodyPr/>
           <a:lstStyle/>
           <a:p>
+            <a:r>
+              <a:rPr lang="en-US" dirty="0" smtClean="0"/>
+              <a:t>How to Use this </a:t>
+            </a:r>
+          </a:p>
+          <a:p>
+            <a:r>
+              <a:rPr lang="en-US" dirty="0" smtClean="0"/>
+              <a:t>PowerPoint Template</a:t>
+            </a:r>
             <a:endParaRPr lang="en-US" dirty="0"/>
           </a:p>
         </p:txBody>
@@ -3889,7 +3909,11 @@
           <a:bodyPr/>
           <a:lstStyle/>
           <a:p>
-            <a:endParaRPr lang="en-US"/>
+            <a:r>
+              <a:rPr lang="en-US" dirty="0" smtClean="0"/>
+              <a:t>January 19, 2016</a:t>
+            </a:r>
+            <a:endParaRPr lang="en-US" dirty="0"/>
           </a:p>
         </p:txBody>
       </p:sp>
@@ -3938,6 +3962,10 @@
           <a:bodyPr/>
           <a:lstStyle/>
           <a:p>
+            <a:r>
+              <a:rPr lang="en-US" dirty="0" smtClean="0"/>
+              <a:t>New Section Slide</a:t>
+            </a:r>
             <a:endParaRPr lang="en-US" dirty="0"/>
           </a:p>
         </p:txBody>
@@ -3974,6 +4002,180 @@
       </p:grpSpPr>
       <p:sp>
         <p:nvSpPr>
+          <p:cNvPr id="2" name="Title 1"/>
+          <p:cNvSpPr>
+            <a:spLocks noGrp="1"/>
+          </p:cNvSpPr>
+          <p:nvPr>
+            <p:ph type="title"/>
+          </p:nvPr>
+        </p:nvSpPr>
+        <p:spPr/>
+        <p:txBody>
+          <a:bodyPr/>
+          <a:lstStyle/>
+          <a:p>
+            <a:r>
+              <a:rPr lang="en-US" dirty="0" smtClean="0"/>
+              <a:t>Agenda Slide</a:t>
+            </a:r>
+            <a:endParaRPr lang="en-US" dirty="0"/>
+          </a:p>
+        </p:txBody>
+      </p:sp>
+      <p:sp>
+        <p:nvSpPr>
+          <p:cNvPr id="3" name="Text Placeholder 2"/>
+          <p:cNvSpPr>
+            <a:spLocks noGrp="1"/>
+          </p:cNvSpPr>
+          <p:nvPr>
+            <p:ph type="body" sz="quarter" idx="10"/>
+          </p:nvPr>
+        </p:nvSpPr>
+        <p:spPr/>
+        <p:txBody>
+          <a:bodyPr/>
+          <a:lstStyle/>
+          <a:p>
+            <a:r>
+              <a:rPr lang="en-US" dirty="0" smtClean="0"/>
+              <a:t>Use this to display an agenda, or</a:t>
+            </a:r>
+          </a:p>
+          <a:p>
+            <a:r>
+              <a:rPr lang="en-US" dirty="0" smtClean="0"/>
+              <a:t>For bullet points that are:</a:t>
+            </a:r>
+          </a:p>
+          <a:p>
+            <a:r>
+              <a:rPr lang="en-US" dirty="0" smtClean="0"/>
+              <a:t>One line and fewer than seven words</a:t>
+            </a:r>
+          </a:p>
+          <a:p>
+            <a:r>
+              <a:rPr lang="en-US" dirty="0" smtClean="0"/>
+              <a:t>The shield and slide number</a:t>
+            </a:r>
+          </a:p>
+          <a:p>
+            <a:r>
+              <a:rPr lang="en-US" dirty="0" smtClean="0"/>
+              <a:t>Should not appear</a:t>
+            </a:r>
+            <a:endParaRPr lang="en-US" dirty="0"/>
+          </a:p>
+        </p:txBody>
+      </p:sp>
+    </p:spTree>
+    <p:extLst>
+      <p:ext uri="{BB962C8B-B14F-4D97-AF65-F5344CB8AC3E}">
+        <p14:creationId xmlns:p14="http://schemas.microsoft.com/office/powerpoint/2010/main" val="2594938262"/>
+      </p:ext>
+    </p:extLst>
+  </p:cSld>
+  <p:clrMapOvr>
+    <a:masterClrMapping/>
+  </p:clrMapOvr>
+</p:sld>
+</file>
+
+<file path=ppt/slides/slide4.xml><?xml version="1.0" encoding="utf-8"?>
+<p:sld xmlns:a="http://schemas.openxmlformats.org/drawingml/2006/main" xmlns:r="http://schemas.openxmlformats.org/officeDocument/2006/relationships" xmlns:p="http://schemas.openxmlformats.org/presentationml/2006/main">
+  <p:cSld>
+    <p:spTree>
+      <p:nvGrpSpPr>
+        <p:cNvPr id="1" name=""/>
+        <p:cNvGrpSpPr/>
+        <p:nvPr/>
+      </p:nvGrpSpPr>
+      <p:grpSpPr>
+        <a:xfrm>
+          <a:off x="0" y="0"/>
+          <a:ext cx="0" cy="0"/>
+          <a:chOff x="0" y="0"/>
+          <a:chExt cx="0" cy="0"/>
+        </a:xfrm>
+      </p:grpSpPr>
+      <p:sp>
+        <p:nvSpPr>
+          <p:cNvPr id="2" name="Title 1"/>
+          <p:cNvSpPr>
+            <a:spLocks noGrp="1"/>
+          </p:cNvSpPr>
+          <p:nvPr>
+            <p:ph type="title"/>
+          </p:nvPr>
+        </p:nvSpPr>
+        <p:spPr/>
+        <p:txBody>
+          <a:bodyPr/>
+          <a:lstStyle/>
+          <a:p>
+            <a:r>
+              <a:rPr lang="en-US" dirty="0" smtClean="0"/>
+              <a:t>Use this slide for</a:t>
+            </a:r>
+            <a:br>
+              <a:rPr lang="en-US" dirty="0" smtClean="0"/>
+            </a:br>
+            <a:r>
+              <a:rPr lang="en-US" dirty="0" smtClean="0"/>
+              <a:t>pull quotes/statistics/items of note.</a:t>
+            </a:r>
+            <a:br>
+              <a:rPr lang="en-US" dirty="0" smtClean="0"/>
+            </a:br>
+            <a:r>
+              <a:rPr lang="en-US" b="1" dirty="0" smtClean="0"/>
+              <a:t>Bold important words</a:t>
+            </a:r>
+            <a:br>
+              <a:rPr lang="en-US" b="1" dirty="0" smtClean="0"/>
+            </a:br>
+            <a:r>
+              <a:rPr lang="en-US" dirty="0" smtClean="0"/>
+              <a:t>to draw attention. The shield and slide number should not appear.</a:t>
+            </a:r>
+            <a:endParaRPr lang="en-US" dirty="0"/>
+          </a:p>
+        </p:txBody>
+      </p:sp>
+    </p:spTree>
+    <p:extLst>
+      <p:ext uri="{BB962C8B-B14F-4D97-AF65-F5344CB8AC3E}">
+        <p14:creationId xmlns:p14="http://schemas.microsoft.com/office/powerpoint/2010/main" val="358202343"/>
+      </p:ext>
+    </p:extLst>
+  </p:cSld>
+  <p:clrMapOvr>
+    <a:masterClrMapping/>
+  </p:clrMapOvr>
+</p:sld>
+</file>
+
+<file path=ppt/slides/slide5.xml><?xml version="1.0" encoding="utf-8"?>
+<p:sld xmlns:a="http://schemas.openxmlformats.org/drawingml/2006/main" xmlns:r="http://schemas.openxmlformats.org/officeDocument/2006/relationships" xmlns:p="http://schemas.openxmlformats.org/presentationml/2006/main">
+  <p:cSld>
+    <p:spTree>
+      <p:nvGrpSpPr>
+        <p:cNvPr id="1" name=""/>
+        <p:cNvGrpSpPr/>
+        <p:nvPr/>
+      </p:nvGrpSpPr>
+      <p:grpSpPr>
+        <a:xfrm>
+          <a:off x="0" y="0"/>
+          <a:ext cx="0" cy="0"/>
+          <a:chOff x="0" y="0"/>
+          <a:chExt cx="0" cy="0"/>
+        </a:xfrm>
+      </p:grpSpPr>
+      <p:sp>
+        <p:nvSpPr>
           <p:cNvPr id="2" name="Text Placeholder 1"/>
           <p:cNvSpPr>
             <a:spLocks noGrp="1"/>
@@ -3987,7 +4189,11 @@
           <a:bodyPr/>
           <a:lstStyle/>
           <a:p>
-            <a:endParaRPr lang="en-US"/>
+            <a:r>
+              <a:rPr lang="en-US" dirty="0" smtClean="0"/>
+              <a:t>Slide Title</a:t>
+            </a:r>
+            <a:endParaRPr lang="en-US" dirty="0"/>
           </a:p>
         </p:txBody>
       </p:sp>
@@ -4006,14 +4212,289 @@
           <a:bodyPr/>
           <a:lstStyle/>
           <a:p>
-            <a:endParaRPr lang="en-US"/>
+            <a:r>
+              <a:rPr lang="en-US" dirty="0" smtClean="0"/>
+              <a:t>Bulleted items that relate to the page title.</a:t>
+            </a:r>
+          </a:p>
+          <a:p>
+            <a:pPr lvl="1"/>
+            <a:r>
+              <a:rPr lang="en-US" dirty="0" smtClean="0"/>
+              <a:t>These slides can have either the division name or slide number in the lower left corner.</a:t>
+            </a:r>
+          </a:p>
+          <a:p>
+            <a:pPr lvl="1"/>
+            <a:r>
+              <a:rPr lang="en-US" dirty="0" smtClean="0"/>
+              <a:t>The shield is always in the lower right corner.</a:t>
+            </a:r>
+          </a:p>
+          <a:p>
+            <a:pPr lvl="2"/>
+            <a:r>
+              <a:rPr lang="en-US" dirty="0" smtClean="0"/>
+              <a:t>There isn’t a third level of bulleted text. There is a style available for making notes. Press “tab” to use the second level and notation text.</a:t>
+            </a:r>
           </a:p>
         </p:txBody>
       </p:sp>
     </p:spTree>
     <p:extLst>
       <p:ext uri="{BB962C8B-B14F-4D97-AF65-F5344CB8AC3E}">
-        <p14:creationId xmlns:p14="http://schemas.microsoft.com/office/powerpoint/2010/main" val="2741536025"/>
+        <p14:creationId xmlns:p14="http://schemas.microsoft.com/office/powerpoint/2010/main" val="3464057685"/>
+      </p:ext>
+    </p:extLst>
+  </p:cSld>
+  <p:clrMapOvr>
+    <a:masterClrMapping/>
+  </p:clrMapOvr>
+</p:sld>
+</file>
+
+<file path=ppt/slides/slide6.xml><?xml version="1.0" encoding="utf-8"?>
+<p:sld xmlns:a="http://schemas.openxmlformats.org/drawingml/2006/main" xmlns:r="http://schemas.openxmlformats.org/officeDocument/2006/relationships" xmlns:p="http://schemas.openxmlformats.org/presentationml/2006/main">
+  <p:cSld>
+    <p:spTree>
+      <p:nvGrpSpPr>
+        <p:cNvPr id="1" name=""/>
+        <p:cNvGrpSpPr/>
+        <p:nvPr/>
+      </p:nvGrpSpPr>
+      <p:grpSpPr>
+        <a:xfrm>
+          <a:off x="0" y="0"/>
+          <a:ext cx="0" cy="0"/>
+          <a:chOff x="0" y="0"/>
+          <a:chExt cx="0" cy="0"/>
+        </a:xfrm>
+      </p:grpSpPr>
+      <p:sp>
+        <p:nvSpPr>
+          <p:cNvPr id="2" name="Text Placeholder 1"/>
+          <p:cNvSpPr>
+            <a:spLocks noGrp="1"/>
+          </p:cNvSpPr>
+          <p:nvPr>
+            <p:ph type="body" sz="quarter" idx="10"/>
+          </p:nvPr>
+        </p:nvSpPr>
+        <p:spPr/>
+        <p:txBody>
+          <a:bodyPr/>
+          <a:lstStyle/>
+          <a:p>
+            <a:r>
+              <a:rPr lang="en-US" dirty="0" smtClean="0"/>
+              <a:t>Page Title</a:t>
+            </a:r>
+            <a:endParaRPr lang="en-US" dirty="0"/>
+          </a:p>
+        </p:txBody>
+      </p:sp>
+      <p:sp>
+        <p:nvSpPr>
+          <p:cNvPr id="3" name="Text Placeholder 2"/>
+          <p:cNvSpPr>
+            <a:spLocks noGrp="1"/>
+          </p:cNvSpPr>
+          <p:nvPr>
+            <p:ph type="body" sz="quarter" idx="11"/>
+          </p:nvPr>
+        </p:nvSpPr>
+        <p:spPr/>
+        <p:txBody>
+          <a:bodyPr/>
+          <a:lstStyle/>
+          <a:p>
+            <a:r>
+              <a:rPr lang="en-US" dirty="0" smtClean="0"/>
+              <a:t>Use this area for blocks of text. Use these slides sparingly as large blocks of text are harder to read at a distance. </a:t>
+            </a:r>
+          </a:p>
+          <a:p>
+            <a:r>
+              <a:rPr lang="en-US" dirty="0" smtClean="0"/>
+              <a:t>These slides can have either the division name or the slide number in the lower left corner. The shield is always in the lower right corner.</a:t>
+            </a:r>
+            <a:endParaRPr lang="en-US" dirty="0"/>
+          </a:p>
+        </p:txBody>
+      </p:sp>
+    </p:spTree>
+    <p:extLst>
+      <p:ext uri="{BB962C8B-B14F-4D97-AF65-F5344CB8AC3E}">
+        <p14:creationId xmlns:p14="http://schemas.microsoft.com/office/powerpoint/2010/main" val="1758291643"/>
+      </p:ext>
+    </p:extLst>
+  </p:cSld>
+  <p:clrMapOvr>
+    <a:masterClrMapping/>
+  </p:clrMapOvr>
+</p:sld>
+</file>
+
+<file path=ppt/slides/slide7.xml><?xml version="1.0" encoding="utf-8"?>
+<p:sld xmlns:a="http://schemas.openxmlformats.org/drawingml/2006/main" xmlns:r="http://schemas.openxmlformats.org/officeDocument/2006/relationships" xmlns:p="http://schemas.openxmlformats.org/presentationml/2006/main">
+  <p:cSld>
+    <p:spTree>
+      <p:nvGrpSpPr>
+        <p:cNvPr id="1" name=""/>
+        <p:cNvGrpSpPr/>
+        <p:nvPr/>
+      </p:nvGrpSpPr>
+      <p:grpSpPr>
+        <a:xfrm>
+          <a:off x="0" y="0"/>
+          <a:ext cx="0" cy="0"/>
+          <a:chOff x="0" y="0"/>
+          <a:chExt cx="0" cy="0"/>
+        </a:xfrm>
+      </p:grpSpPr>
+      <p:sp>
+        <p:nvSpPr>
+          <p:cNvPr id="2" name="Text Placeholder 1"/>
+          <p:cNvSpPr>
+            <a:spLocks noGrp="1"/>
+          </p:cNvSpPr>
+          <p:nvPr>
+            <p:ph type="body" sz="quarter" idx="10"/>
+          </p:nvPr>
+        </p:nvSpPr>
+        <p:spPr/>
+        <p:txBody>
+          <a:bodyPr/>
+          <a:lstStyle/>
+          <a:p>
+            <a:r>
+              <a:rPr lang="en-US" dirty="0" smtClean="0"/>
+              <a:t>Page Title</a:t>
+            </a:r>
+            <a:endParaRPr lang="en-US" dirty="0"/>
+          </a:p>
+        </p:txBody>
+      </p:sp>
+      <p:sp>
+        <p:nvSpPr>
+          <p:cNvPr id="3" name="Text Placeholder 2"/>
+          <p:cNvSpPr>
+            <a:spLocks noGrp="1"/>
+          </p:cNvSpPr>
+          <p:nvPr>
+            <p:ph type="body" sz="quarter" idx="11"/>
+          </p:nvPr>
+        </p:nvSpPr>
+        <p:spPr/>
+        <p:txBody>
+          <a:bodyPr/>
+          <a:lstStyle/>
+          <a:p>
+            <a:r>
+              <a:rPr lang="en-US" dirty="0" smtClean="0"/>
+              <a:t>Use this slide for longer lines of bulleted text.</a:t>
+            </a:r>
+          </a:p>
+          <a:p>
+            <a:r>
+              <a:rPr lang="en-US" dirty="0" smtClean="0"/>
+              <a:t>These slides can have either the division name or slide number in the lower left corner. The shield is always in the lower right corner. </a:t>
+            </a:r>
+            <a:endParaRPr lang="en-US" dirty="0"/>
+          </a:p>
+        </p:txBody>
+      </p:sp>
+    </p:spTree>
+    <p:extLst>
+      <p:ext uri="{BB962C8B-B14F-4D97-AF65-F5344CB8AC3E}">
+        <p14:creationId xmlns:p14="http://schemas.microsoft.com/office/powerpoint/2010/main" val="2812317420"/>
+      </p:ext>
+    </p:extLst>
+  </p:cSld>
+  <p:clrMapOvr>
+    <a:masterClrMapping/>
+  </p:clrMapOvr>
+</p:sld>
+</file>
+
+<file path=ppt/slides/slide8.xml><?xml version="1.0" encoding="utf-8"?>
+<p:sld xmlns:a="http://schemas.openxmlformats.org/drawingml/2006/main" xmlns:r="http://schemas.openxmlformats.org/officeDocument/2006/relationships" xmlns:p="http://schemas.openxmlformats.org/presentationml/2006/main">
+  <p:cSld>
+    <p:spTree>
+      <p:nvGrpSpPr>
+        <p:cNvPr id="1" name=""/>
+        <p:cNvGrpSpPr/>
+        <p:nvPr/>
+      </p:nvGrpSpPr>
+      <p:grpSpPr>
+        <a:xfrm>
+          <a:off x="0" y="0"/>
+          <a:ext cx="0" cy="0"/>
+          <a:chOff x="0" y="0"/>
+          <a:chExt cx="0" cy="0"/>
+        </a:xfrm>
+      </p:grpSpPr>
+      <p:sp>
+        <p:nvSpPr>
+          <p:cNvPr id="2" name="Text Placeholder 1"/>
+          <p:cNvSpPr>
+            <a:spLocks noGrp="1"/>
+          </p:cNvSpPr>
+          <p:nvPr>
+            <p:ph type="body" sz="quarter" idx="10"/>
+          </p:nvPr>
+        </p:nvSpPr>
+        <p:spPr/>
+        <p:txBody>
+          <a:bodyPr/>
+          <a:lstStyle/>
+          <a:p>
+            <a:r>
+              <a:rPr lang="en-US" dirty="0" smtClean="0"/>
+              <a:t>Extra Tips</a:t>
+            </a:r>
+            <a:endParaRPr lang="en-US" dirty="0"/>
+          </a:p>
+        </p:txBody>
+      </p:sp>
+      <p:sp>
+        <p:nvSpPr>
+          <p:cNvPr id="3" name="Text Placeholder 2"/>
+          <p:cNvSpPr>
+            <a:spLocks noGrp="1"/>
+          </p:cNvSpPr>
+          <p:nvPr>
+            <p:ph type="body" sz="quarter" idx="11"/>
+          </p:nvPr>
+        </p:nvSpPr>
+        <p:spPr/>
+        <p:txBody>
+          <a:bodyPr/>
+          <a:lstStyle/>
+          <a:p>
+            <a:r>
+              <a:rPr lang="en-US" dirty="0" smtClean="0"/>
+              <a:t>Only Arial should be used as the typeface for these slides.</a:t>
+            </a:r>
+          </a:p>
+          <a:p>
+            <a:r>
+              <a:rPr lang="en-US" dirty="0" smtClean="0"/>
+              <a:t>The text color default it is 90% black. Titles should be JHEP blue.</a:t>
+            </a:r>
+          </a:p>
+          <a:p>
+            <a:r>
+              <a:rPr lang="en-US" dirty="0" smtClean="0"/>
+              <a:t>The preferred color palette can be found in the “theme colors,” and is the default. </a:t>
+            </a:r>
+          </a:p>
+        </p:txBody>
+      </p:sp>
+    </p:spTree>
+    <p:extLst>
+      <p:ext uri="{BB962C8B-B14F-4D97-AF65-F5344CB8AC3E}">
+        <p14:creationId xmlns:p14="http://schemas.microsoft.com/office/powerpoint/2010/main" val="4165093924"/>
       </p:ext>
     </p:extLst>
   </p:cSld>

</xml_diff>